<commit_message>
new slideck, with side and fron view comparison of 3 versions
</commit_message>
<xml_diff>
--- a/multimeterStand.pptx
+++ b/multimeterStand.pptx
@@ -106,6 +106,11 @@
       </a:defRPr>
     </a:lvl9pPr>
   </p:defaultTextStyle>
+  <p:extLst>
+    <p:ext uri="{EFAFB233-063F-42B5-8137-9DF3F51BA10A}">
+      <p15:sldGuideLst xmlns:p15="http://schemas.microsoft.com/office/powerpoint/2012/main"/>
+    </p:ext>
+  </p:extLst>
 </p:presentation>
 </file>
 
@@ -3485,7 +3490,7 @@
             <a:pPr algn="ctr"/>
             <a:r>
               <a:rPr lang="en-US" dirty="0"/>
-              <a:t>3 options for multimeter4040 design</a:t>
+              <a:t>3 options for multimeter4040 design, side view</a:t>
             </a:r>
             <a:endParaRPr lang="en-IE" dirty="0"/>
           </a:p>
@@ -3686,12 +3691,154 @@
           <a:chExt cx="0" cy="0"/>
         </a:xfrm>
       </p:grpSpPr>
+      <p:sp>
+        <p:nvSpPr>
+          <p:cNvPr id="2" name="Title 1">
+            <a:extLst>
+              <a:ext uri="{FF2B5EF4-FFF2-40B4-BE49-F238E27FC236}">
+                <a16:creationId xmlns:a16="http://schemas.microsoft.com/office/drawing/2014/main" id="{969612B0-087F-41EF-AF80-55A14EE7E66A}"/>
+              </a:ext>
+            </a:extLst>
+          </p:cNvPr>
+          <p:cNvSpPr>
+            <a:spLocks noGrp="1"/>
+          </p:cNvSpPr>
+          <p:nvPr>
+            <p:ph type="title"/>
+          </p:nvPr>
+        </p:nvSpPr>
+        <p:spPr>
+          <a:xfrm>
+            <a:off x="0" y="1"/>
+            <a:ext cx="12192000" cy="550416"/>
+          </a:xfrm>
+        </p:spPr>
+        <p:txBody>
+          <a:bodyPr>
+            <a:normAutofit fontScale="90000"/>
+          </a:bodyPr>
+          <a:lstStyle/>
+          <a:p>
+            <a:pPr algn="ctr"/>
+            <a:r>
+              <a:rPr lang="en-US" dirty="0"/>
+              <a:t>3 options for multimeter4040 design, front view</a:t>
+            </a:r>
+            <a:endParaRPr lang="en-IE" dirty="0"/>
+          </a:p>
+        </p:txBody>
+      </p:sp>
+      <p:sp>
+        <p:nvSpPr>
+          <p:cNvPr id="10" name="TextBox 9">
+            <a:extLst>
+              <a:ext uri="{FF2B5EF4-FFF2-40B4-BE49-F238E27FC236}">
+                <a16:creationId xmlns:a16="http://schemas.microsoft.com/office/drawing/2014/main" id="{0323B058-A436-4C94-945D-DAE477C36382}"/>
+              </a:ext>
+            </a:extLst>
+          </p:cNvPr>
+          <p:cNvSpPr txBox="1"/>
+          <p:nvPr/>
+        </p:nvSpPr>
+        <p:spPr>
+          <a:xfrm>
+            <a:off x="663463" y="5884528"/>
+            <a:ext cx="2236959" cy="369332"/>
+          </a:xfrm>
+          <a:prstGeom prst="rect">
+            <a:avLst/>
+          </a:prstGeom>
+          <a:noFill/>
+        </p:spPr>
+        <p:txBody>
+          <a:bodyPr wrap="none" rtlCol="0">
+            <a:spAutoFit/>
+          </a:bodyPr>
+          <a:lstStyle/>
+          <a:p>
+            <a:r>
+              <a:rPr lang="en-IE" dirty="0"/>
+              <a:t>multimeter4040-Early</a:t>
+            </a:r>
+          </a:p>
+        </p:txBody>
+      </p:sp>
+      <p:sp>
+        <p:nvSpPr>
+          <p:cNvPr id="11" name="TextBox 10">
+            <a:extLst>
+              <a:ext uri="{FF2B5EF4-FFF2-40B4-BE49-F238E27FC236}">
+                <a16:creationId xmlns:a16="http://schemas.microsoft.com/office/drawing/2014/main" id="{E1D21B58-F815-4A48-AC8E-52FD6460EBFB}"/>
+              </a:ext>
+            </a:extLst>
+          </p:cNvPr>
+          <p:cNvSpPr txBox="1"/>
+          <p:nvPr/>
+        </p:nvSpPr>
+        <p:spPr>
+          <a:xfrm>
+            <a:off x="4822819" y="5884528"/>
+            <a:ext cx="2014782" cy="369332"/>
+          </a:xfrm>
+          <a:prstGeom prst="rect">
+            <a:avLst/>
+          </a:prstGeom>
+          <a:noFill/>
+        </p:spPr>
+        <p:txBody>
+          <a:bodyPr wrap="none" rtlCol="0">
+            <a:spAutoFit/>
+          </a:bodyPr>
+          <a:lstStyle/>
+          <a:p>
+            <a:r>
+              <a:rPr lang="en-IE" dirty="0"/>
+              <a:t>multimeter4040-01</a:t>
+            </a:r>
+          </a:p>
+        </p:txBody>
+      </p:sp>
+      <p:sp>
+        <p:nvSpPr>
+          <p:cNvPr id="12" name="TextBox 11">
+            <a:extLst>
+              <a:ext uri="{FF2B5EF4-FFF2-40B4-BE49-F238E27FC236}">
+                <a16:creationId xmlns:a16="http://schemas.microsoft.com/office/drawing/2014/main" id="{F7687493-A3BE-4E88-938E-2CCA2957F840}"/>
+              </a:ext>
+            </a:extLst>
+          </p:cNvPr>
+          <p:cNvSpPr txBox="1"/>
+          <p:nvPr/>
+        </p:nvSpPr>
+        <p:spPr>
+          <a:xfrm>
+            <a:off x="8974055" y="5884528"/>
+            <a:ext cx="2014782" cy="369332"/>
+          </a:xfrm>
+          <a:prstGeom prst="rect">
+            <a:avLst/>
+          </a:prstGeom>
+          <a:noFill/>
+        </p:spPr>
+        <p:txBody>
+          <a:bodyPr wrap="none" rtlCol="0">
+            <a:spAutoFit/>
+          </a:bodyPr>
+          <a:lstStyle/>
+          <a:p>
+            <a:r>
+              <a:rPr lang="en-IE" dirty="0"/>
+              <a:t>multimeter4040-02</a:t>
+            </a:r>
+          </a:p>
+        </p:txBody>
+      </p:sp>
       <p:pic>
         <p:nvPicPr>
-          <p:cNvPr id="7" name="Picture 6">
-            <a:extLst>
-              <a:ext uri="{FF2B5EF4-FFF2-40B4-BE49-F238E27FC236}">
-                <a16:creationId xmlns:a16="http://schemas.microsoft.com/office/drawing/2014/main" id="{A01631B4-0F26-4CC9-9D23-E060A56DC312}"/>
+          <p:cNvPr id="4" name="Picture 3">
+            <a:extLst>
+              <a:ext uri="{FF2B5EF4-FFF2-40B4-BE49-F238E27FC236}">
+                <a16:creationId xmlns:a16="http://schemas.microsoft.com/office/drawing/2014/main" id="{9758F7F9-5969-4A9A-B700-E21883D63D71}"/>
               </a:ext>
             </a:extLst>
           </p:cNvPr>
@@ -3708,57 +3855,20 @@
         </p:blipFill>
         <p:spPr>
           <a:xfrm>
-            <a:off x="4178173" y="1530571"/>
-            <a:ext cx="3541000" cy="4016012"/>
+            <a:off x="425693" y="604140"/>
+            <a:ext cx="2610223" cy="5179660"/>
           </a:xfrm>
           <a:prstGeom prst="rect">
             <a:avLst/>
           </a:prstGeom>
         </p:spPr>
       </p:pic>
-      <p:sp>
-        <p:nvSpPr>
-          <p:cNvPr id="2" name="Title 1">
-            <a:extLst>
-              <a:ext uri="{FF2B5EF4-FFF2-40B4-BE49-F238E27FC236}">
-                <a16:creationId xmlns:a16="http://schemas.microsoft.com/office/drawing/2014/main" id="{969612B0-087F-41EF-AF80-55A14EE7E66A}"/>
-              </a:ext>
-            </a:extLst>
-          </p:cNvPr>
-          <p:cNvSpPr>
-            <a:spLocks noGrp="1"/>
-          </p:cNvSpPr>
-          <p:nvPr>
-            <p:ph type="title"/>
-          </p:nvPr>
-        </p:nvSpPr>
-        <p:spPr>
-          <a:xfrm>
-            <a:off x="0" y="1"/>
-            <a:ext cx="12192000" cy="550416"/>
-          </a:xfrm>
-        </p:spPr>
-        <p:txBody>
-          <a:bodyPr>
-            <a:normAutofit fontScale="90000"/>
-          </a:bodyPr>
-          <a:lstStyle/>
-          <a:p>
-            <a:pPr algn="ctr"/>
-            <a:r>
-              <a:rPr lang="en-US" dirty="0"/>
-              <a:t>3 options for multimeter4040 design</a:t>
-            </a:r>
-            <a:endParaRPr lang="en-IE" dirty="0"/>
-          </a:p>
-        </p:txBody>
-      </p:sp>
       <p:pic>
         <p:nvPicPr>
-          <p:cNvPr id="5" name="Picture 4">
-            <a:extLst>
-              <a:ext uri="{FF2B5EF4-FFF2-40B4-BE49-F238E27FC236}">
-                <a16:creationId xmlns:a16="http://schemas.microsoft.com/office/drawing/2014/main" id="{2E214115-AB0A-46D0-8E63-7A21AB8C4407}"/>
+          <p:cNvPr id="8" name="Picture 7">
+            <a:extLst>
+              <a:ext uri="{FF2B5EF4-FFF2-40B4-BE49-F238E27FC236}">
+                <a16:creationId xmlns:a16="http://schemas.microsoft.com/office/drawing/2014/main" id="{05F6D07A-8F0C-4A73-A9C4-456825719657}"/>
               </a:ext>
             </a:extLst>
           </p:cNvPr>
@@ -3775,125 +3885,20 @@
         </p:blipFill>
         <p:spPr>
           <a:xfrm>
-            <a:off x="441286" y="1530571"/>
-            <a:ext cx="3701838" cy="3939419"/>
+            <a:off x="4512520" y="604140"/>
+            <a:ext cx="2635380" cy="5179660"/>
           </a:xfrm>
           <a:prstGeom prst="rect">
             <a:avLst/>
           </a:prstGeom>
         </p:spPr>
       </p:pic>
-      <p:sp>
-        <p:nvSpPr>
-          <p:cNvPr id="10" name="TextBox 9">
-            <a:extLst>
-              <a:ext uri="{FF2B5EF4-FFF2-40B4-BE49-F238E27FC236}">
-                <a16:creationId xmlns:a16="http://schemas.microsoft.com/office/drawing/2014/main" id="{0323B058-A436-4C94-945D-DAE477C36382}"/>
-              </a:ext>
-            </a:extLst>
-          </p:cNvPr>
-          <p:cNvSpPr txBox="1"/>
-          <p:nvPr/>
-        </p:nvSpPr>
-        <p:spPr>
-          <a:xfrm>
-            <a:off x="441286" y="5885895"/>
-            <a:ext cx="2236959" cy="369332"/>
-          </a:xfrm>
-          <a:prstGeom prst="rect">
-            <a:avLst/>
-          </a:prstGeom>
-          <a:noFill/>
-        </p:spPr>
-        <p:txBody>
-          <a:bodyPr wrap="none" rtlCol="0">
-            <a:spAutoFit/>
-          </a:bodyPr>
-          <a:lstStyle/>
-          <a:p>
-            <a:r>
-              <a:rPr lang="en-IE" dirty="0"/>
-              <a:t>multimeter4040-Early</a:t>
-            </a:r>
-          </a:p>
-        </p:txBody>
-      </p:sp>
-      <p:sp>
-        <p:nvSpPr>
-          <p:cNvPr id="11" name="TextBox 10">
-            <a:extLst>
-              <a:ext uri="{FF2B5EF4-FFF2-40B4-BE49-F238E27FC236}">
-                <a16:creationId xmlns:a16="http://schemas.microsoft.com/office/drawing/2014/main" id="{E1D21B58-F815-4A48-AC8E-52FD6460EBFB}"/>
-              </a:ext>
-            </a:extLst>
-          </p:cNvPr>
-          <p:cNvSpPr txBox="1"/>
-          <p:nvPr/>
-        </p:nvSpPr>
-        <p:spPr>
-          <a:xfrm>
-            <a:off x="4143124" y="5885895"/>
-            <a:ext cx="2014782" cy="369332"/>
-          </a:xfrm>
-          <a:prstGeom prst="rect">
-            <a:avLst/>
-          </a:prstGeom>
-          <a:noFill/>
-        </p:spPr>
-        <p:txBody>
-          <a:bodyPr wrap="none" rtlCol="0">
-            <a:spAutoFit/>
-          </a:bodyPr>
-          <a:lstStyle/>
-          <a:p>
-            <a:r>
-              <a:rPr lang="en-IE" dirty="0"/>
-              <a:t>multimeter4040-01</a:t>
-            </a:r>
-          </a:p>
-        </p:txBody>
-      </p:sp>
-      <p:sp>
-        <p:nvSpPr>
-          <p:cNvPr id="12" name="TextBox 11">
-            <a:extLst>
-              <a:ext uri="{FF2B5EF4-FFF2-40B4-BE49-F238E27FC236}">
-                <a16:creationId xmlns:a16="http://schemas.microsoft.com/office/drawing/2014/main" id="{F7687493-A3BE-4E88-938E-2CCA2957F840}"/>
-              </a:ext>
-            </a:extLst>
-          </p:cNvPr>
-          <p:cNvSpPr txBox="1"/>
-          <p:nvPr/>
-        </p:nvSpPr>
-        <p:spPr>
-          <a:xfrm>
-            <a:off x="8334864" y="5885895"/>
-            <a:ext cx="2014782" cy="369332"/>
-          </a:xfrm>
-          <a:prstGeom prst="rect">
-            <a:avLst/>
-          </a:prstGeom>
-          <a:noFill/>
-        </p:spPr>
-        <p:txBody>
-          <a:bodyPr wrap="none" rtlCol="0">
-            <a:spAutoFit/>
-          </a:bodyPr>
-          <a:lstStyle/>
-          <a:p>
-            <a:r>
-              <a:rPr lang="en-IE" dirty="0"/>
-              <a:t>multimeter4040-02</a:t>
-            </a:r>
-          </a:p>
-        </p:txBody>
-      </p:sp>
       <p:pic>
         <p:nvPicPr>
-          <p:cNvPr id="14" name="Picture 13">
-            <a:extLst>
-              <a:ext uri="{FF2B5EF4-FFF2-40B4-BE49-F238E27FC236}">
-                <a16:creationId xmlns:a16="http://schemas.microsoft.com/office/drawing/2014/main" id="{31DF74FF-7327-4071-AEE1-29CC98DEA211}"/>
+          <p:cNvPr id="13" name="Picture 12">
+            <a:extLst>
+              <a:ext uri="{FF2B5EF4-FFF2-40B4-BE49-F238E27FC236}">
+                <a16:creationId xmlns:a16="http://schemas.microsoft.com/office/drawing/2014/main" id="{A2BC77E5-E022-4A65-9D3D-87930544F501}"/>
               </a:ext>
             </a:extLst>
           </p:cNvPr>
@@ -3910,8 +3915,8 @@
         </p:blipFill>
         <p:spPr>
           <a:xfrm>
-            <a:off x="7832128" y="1530571"/>
-            <a:ext cx="4006981" cy="3939419"/>
+            <a:off x="8624504" y="541536"/>
+            <a:ext cx="2713885" cy="5242264"/>
           </a:xfrm>
           <a:prstGeom prst="rect">
             <a:avLst/>

</xml_diff>